<commit_message>
Fixed a couple of bugs
</commit_message>
<xml_diff>
--- a/ChinookMast.pptx
+++ b/ChinookMast.pptx
@@ -3376,41 +3376,21 @@
             </a:r>
             <a:r>
               <a:rPr lang="fr-CA" sz="2000" dirty="0" smtClean="0"/>
-              <a:t> pas encore codé;</a:t>
-            </a:r>
-          </a:p>
-          <a:p>
+              <a:t> pas encore codé</a:t>
+            </a:r>
             <a:r>
               <a:rPr lang="fr-CA" sz="2000" dirty="0" smtClean="0"/>
-              <a:t>Le stop tourne du mauvais sens si on ne pèse pas assez longtemps. Pourrait être réglé en ajoutant les flags </a:t>
-            </a:r>
-            <a:r>
-              <a:rPr lang="fr-CA" sz="2000" dirty="0" err="1" smtClean="0"/>
-              <a:t>oManualLeft</a:t>
-            </a:r>
+              <a:t>;</a:t>
+            </a:r>
+          </a:p>
+          <a:p>
             <a:r>
               <a:rPr lang="fr-CA" sz="2000" dirty="0" smtClean="0"/>
-              <a:t> et </a:t>
-            </a:r>
-            <a:r>
-              <a:rPr lang="fr-CA" sz="2000" dirty="0" err="1" smtClean="0"/>
-              <a:t>oManualRight</a:t>
+              <a:t>Ce </a:t>
             </a:r>
             <a:r>
               <a:rPr lang="fr-CA" sz="2000" dirty="0" smtClean="0"/>
-              <a:t> dans la routine;</a:t>
-            </a:r>
-          </a:p>
-          <a:p>
-            <a:r>
-              <a:rPr lang="fr-CA" sz="2000" dirty="0" smtClean="0"/>
-              <a:t>Si le mât s’arrête trop vite en régulation, il reste une vitesse résiduelle. Jouer sur PWM MIN et ERROR. Si le mât arrête trop vite si l’erreur est haute et PWM MIN aussi.</a:t>
-            </a:r>
-          </a:p>
-          <a:p>
-            <a:r>
-              <a:rPr lang="fr-CA" sz="2000" dirty="0" smtClean="0"/>
-              <a:t>Ce serait mieux que le changement de mode se fasse sans qu’on ne doive relâcher les boutons;</a:t>
+              <a:t>serait mieux que le changement de mode se fasse sans qu’on ne doive relâcher les boutons;</a:t>
             </a:r>
           </a:p>
           <a:p>
@@ -3440,21 +3420,13 @@
             </a:r>
             <a:r>
               <a:rPr lang="fr-CA" sz="2000" dirty="0" smtClean="0"/>
-              <a:t> et ça va </a:t>
-            </a:r>
+              <a:t> et ça va bien;</a:t>
+            </a:r>
+          </a:p>
+          <a:p>
             <a:r>
               <a:rPr lang="fr-CA" sz="2000" dirty="0" smtClean="0"/>
-              <a:t>bien;</a:t>
-            </a:r>
-          </a:p>
-          <a:p>
-            <a:r>
-              <a:rPr lang="fr-CA" sz="2000" dirty="0" smtClean="0"/>
-              <a:t>S’il y a un power-down pendant que l’EEPROM fait une écriture interne, la valeur est erronée. Pourrait être évité avec </a:t>
-            </a:r>
-            <a:r>
-              <a:rPr lang="fr-CA" sz="2000" smtClean="0"/>
-              <a:t>une redondance.</a:t>
+              <a:t>S’il y a un power-down pendant que l’EEPROM fait une écriture interne, la valeur est erronée. Pourrait être évité avec une redondance.</a:t>
             </a:r>
             <a:endParaRPr lang="en-CA" sz="2000" dirty="0"/>
           </a:p>

</xml_diff>